<commit_message>
intercambio de mapas 09-09, 11-09, 11-10, 11-12, 10-09, ajustes 10-02, 10-03
</commit_message>
<xml_diff>
--- a/fuentes/contenidos/grado10/guion02/CN_10_02.pptx
+++ b/fuentes/contenidos/grado10/guion02/CN_10_02.pptx
@@ -106,7 +106,18 @@
   </p:defaultTextStyle>
   <p:extLst>
     <p:ext uri="{EFAFB233-063F-42B5-8137-9DF3F51BA10A}">
-      <p15:sldGuideLst xmlns:p15="http://schemas.microsoft.com/office/powerpoint/2012/main" xmlns=""/>
+      <p15:sldGuideLst xmlns:p15="http://schemas.microsoft.com/office/powerpoint/2012/main">
+        <p15:guide id="1" orient="horz" pos="2160">
+          <p15:clr>
+            <a:srgbClr val="A4A3A4"/>
+          </p15:clr>
+        </p15:guide>
+        <p15:guide id="2" pos="2880">
+          <p15:clr>
+            <a:srgbClr val="A4A3A4"/>
+          </p15:clr>
+        </p15:guide>
+      </p15:sldGuideLst>
     </p:ext>
   </p:extLst>
 </p:presentation>
@@ -142,7 +153,7 @@
   <p:timing>
     <p:tnLst>
       <p:par>
-        <p:cTn xmlns:p14="http://schemas.microsoft.com/office/powerpoint/2010/main" id="1" dur="indefinite" restart="never" nodeType="tmRoot"/>
+        <p:cTn id="1" dur="indefinite" restart="never" nodeType="tmRoot"/>
       </p:par>
     </p:tnLst>
   </p:timing>
@@ -179,7 +190,7 @@
   <p:timing>
     <p:tnLst>
       <p:par>
-        <p:cTn xmlns:p14="http://schemas.microsoft.com/office/powerpoint/2010/main" id="1" dur="indefinite" restart="never" nodeType="tmRoot"/>
+        <p:cTn id="1" dur="indefinite" restart="never" nodeType="tmRoot"/>
       </p:par>
     </p:tnLst>
   </p:timing>
@@ -216,7 +227,7 @@
   <p:timing>
     <p:tnLst>
       <p:par>
-        <p:cTn xmlns:p14="http://schemas.microsoft.com/office/powerpoint/2010/main" id="1" dur="indefinite" restart="never" nodeType="tmRoot"/>
+        <p:cTn id="1" dur="indefinite" restart="never" nodeType="tmRoot"/>
       </p:par>
     </p:tnLst>
   </p:timing>
@@ -253,7 +264,7 @@
   <p:timing>
     <p:tnLst>
       <p:par>
-        <p:cTn xmlns:p14="http://schemas.microsoft.com/office/powerpoint/2010/main" id="1" dur="indefinite" restart="never" nodeType="tmRoot"/>
+        <p:cTn id="1" dur="indefinite" restart="never" nodeType="tmRoot"/>
       </p:par>
     </p:tnLst>
   </p:timing>
@@ -290,7 +301,7 @@
   <p:timing>
     <p:tnLst>
       <p:par>
-        <p:cTn xmlns:p14="http://schemas.microsoft.com/office/powerpoint/2010/main" id="1" dur="indefinite" restart="never" nodeType="tmRoot"/>
+        <p:cTn id="1" dur="indefinite" restart="never" nodeType="tmRoot"/>
       </p:par>
     </p:tnLst>
   </p:timing>
@@ -327,7 +338,7 @@
   <p:timing>
     <p:tnLst>
       <p:par>
-        <p:cTn xmlns:p14="http://schemas.microsoft.com/office/powerpoint/2010/main" id="1" dur="indefinite" restart="never" nodeType="tmRoot"/>
+        <p:cTn id="1" dur="indefinite" restart="never" nodeType="tmRoot"/>
       </p:par>
     </p:tnLst>
   </p:timing>
@@ -364,7 +375,7 @@
   <p:timing>
     <p:tnLst>
       <p:par>
-        <p:cTn xmlns:p14="http://schemas.microsoft.com/office/powerpoint/2010/main" id="1" dur="indefinite" restart="never" nodeType="tmRoot"/>
+        <p:cTn id="1" dur="indefinite" restart="never" nodeType="tmRoot"/>
       </p:par>
     </p:tnLst>
   </p:timing>
@@ -401,7 +412,7 @@
   <p:timing>
     <p:tnLst>
       <p:par>
-        <p:cTn xmlns:p14="http://schemas.microsoft.com/office/powerpoint/2010/main" id="1" dur="indefinite" restart="never" nodeType="tmRoot"/>
+        <p:cTn id="1" dur="indefinite" restart="never" nodeType="tmRoot"/>
       </p:par>
     </p:tnLst>
   </p:timing>
@@ -450,7 +461,7 @@
           <a:p>
             <a:fld id="{5001C876-01F7-4317-94B9-1AE222133113}" type="datetimeFigureOut">
               <a:rPr lang="es-ES" smtClean="0"/>
-              <a:t>03/09/15</a:t>
+              <a:t>14/09/2015</a:t>
             </a:fld>
             <a:endParaRPr lang="es-ES"/>
           </a:p>
@@ -508,7 +519,7 @@
           <a:p>
             <a:fld id="{58140F73-F5A2-4B82-A2FA-BF1850CF1309}" type="slidenum">
               <a:rPr lang="es-ES" smtClean="0"/>
-              <a:t>‹#›</a:t>
+              <a:t>‹Nº›</a:t>
             </a:fld>
             <a:endParaRPr lang="es-ES"/>
           </a:p>
@@ -527,7 +538,7 @@
   <p:timing>
     <p:tnLst>
       <p:par>
-        <p:cTn xmlns:p14="http://schemas.microsoft.com/office/powerpoint/2010/main" id="1" dur="indefinite" restart="never" nodeType="tmRoot"/>
+        <p:cTn id="1" dur="indefinite" restart="never" nodeType="tmRoot"/>
       </p:par>
     </p:tnLst>
   </p:timing>
@@ -564,7 +575,7 @@
   <p:timing>
     <p:tnLst>
       <p:par>
-        <p:cTn xmlns:p14="http://schemas.microsoft.com/office/powerpoint/2010/main" id="1" dur="indefinite" restart="never" nodeType="tmRoot"/>
+        <p:cTn id="1" dur="indefinite" restart="never" nodeType="tmRoot"/>
       </p:par>
     </p:tnLst>
   </p:timing>
@@ -601,7 +612,7 @@
   <p:timing>
     <p:tnLst>
       <p:par>
-        <p:cTn xmlns:p14="http://schemas.microsoft.com/office/powerpoint/2010/main" id="1" dur="indefinite" restart="never" nodeType="tmRoot"/>
+        <p:cTn id="1" dur="indefinite" restart="never" nodeType="tmRoot"/>
       </p:par>
     </p:tnLst>
   </p:timing>
@@ -714,7 +725,7 @@
   <p:timing>
     <p:tnLst>
       <p:par>
-        <p:cTn xmlns:p14="http://schemas.microsoft.com/office/powerpoint/2010/main" id="1" dur="indefinite" restart="never" nodeType="tmRoot"/>
+        <p:cTn id="1" dur="indefinite" restart="never" nodeType="tmRoot"/>
       </p:par>
     </p:tnLst>
   </p:timing>
@@ -1175,8 +1186,12 @@
           <a:p>
             <a:pPr algn="ctr"/>
             <a:r>
+              <a:rPr lang="es-ES_tradnl" sz="1300" b="1" dirty="0"/>
+              <a:t>g</a:t>
+            </a:r>
+            <a:r>
               <a:rPr lang="es-ES_tradnl" sz="1300" b="1" dirty="0" smtClean="0"/>
-              <a:t>Generalidades</a:t>
+              <a:t>eneralidades</a:t>
             </a:r>
             <a:endParaRPr lang="es-ES" sz="1300" b="1" dirty="0"/>
           </a:p>
@@ -1325,11 +1340,6 @@
               </a:rPr>
               <a:t>= 0</a:t>
             </a:r>
-            <a:endParaRPr lang="es-ES_tradnl" sz="900" dirty="0" smtClean="0">
-              <a:solidFill>
-                <a:schemeClr val="bg1"/>
-              </a:solidFill>
-            </a:endParaRPr>
           </a:p>
           <a:p>
             <a:pPr marL="171450" indent="-171450">
@@ -1481,8 +1491,8 @@
         </p:nvCxnSpPr>
         <p:spPr>
           <a:xfrm flipH="1">
-            <a:off x="867263" y="2553193"/>
-            <a:ext cx="2345" cy="203835"/>
+            <a:off x="867263" y="2691692"/>
+            <a:ext cx="2345" cy="65336"/>
           </a:xfrm>
           <a:prstGeom prst="straightConnector1">
             <a:avLst/>
@@ -1513,7 +1523,7 @@
         <p:spPr>
           <a:xfrm>
             <a:off x="358204" y="2183861"/>
-            <a:ext cx="1022808" cy="369332"/>
+            <a:ext cx="1022808" cy="507831"/>
           </a:xfrm>
           <a:prstGeom prst="rect">
             <a:avLst/>
@@ -1528,12 +1538,8 @@
           <a:p>
             <a:pPr algn="ctr"/>
             <a:r>
-              <a:rPr lang="en-US" sz="900" dirty="0" err="1"/>
-              <a:t>s</a:t>
-            </a:r>
-            <a:r>
               <a:rPr lang="en-US" sz="900" dirty="0" err="1" smtClean="0"/>
-              <a:t>us</a:t>
+              <a:t>cuyas</a:t>
             </a:r>
             <a:r>
               <a:rPr lang="en-US" sz="900" dirty="0" smtClean="0"/>
@@ -1610,7 +1616,7 @@
             <a:pPr algn="ctr"/>
             <a:r>
               <a:rPr lang="en-US" sz="900" dirty="0" err="1" smtClean="0"/>
-              <a:t>sus</a:t>
+              <a:t>cuyas</a:t>
             </a:r>
             <a:r>
               <a:rPr lang="en-US" sz="900" dirty="0" smtClean="0"/>
@@ -1618,15 +1624,7 @@
             </a:r>
             <a:r>
               <a:rPr lang="en-US" sz="900" dirty="0" err="1" smtClean="0"/>
-              <a:t>caracter</a:t>
-            </a:r>
-            <a:r>
-              <a:rPr lang="en-US" sz="900" dirty="0" err="1" smtClean="0"/>
-              <a:t>í</a:t>
-            </a:r>
-            <a:r>
-              <a:rPr lang="en-US" sz="900" dirty="0" err="1" smtClean="0"/>
-              <a:t>sticas</a:t>
+              <a:t>características</a:t>
             </a:r>
             <a:r>
               <a:rPr lang="en-US" sz="900" dirty="0" smtClean="0"/>
@@ -1741,7 +1739,7 @@
         <p:spPr>
           <a:xfrm>
             <a:off x="6838028" y="802929"/>
-            <a:ext cx="1079321" cy="230832"/>
+            <a:ext cx="1079321" cy="369332"/>
           </a:xfrm>
           <a:prstGeom prst="rect">
             <a:avLst/>
@@ -1756,12 +1754,20 @@
           <a:p>
             <a:pPr algn="ctr"/>
             <a:r>
-              <a:rPr lang="en-US" sz="900" dirty="0" err="1"/>
-              <a:t>p</a:t>
+              <a:rPr lang="en-US" sz="900" dirty="0" smtClean="0"/>
+              <a:t>del </a:t>
             </a:r>
             <a:r>
               <a:rPr lang="en-US" sz="900" dirty="0" err="1" smtClean="0"/>
-              <a:t>resenta</a:t>
+              <a:t>cual</a:t>
+            </a:r>
+            <a:r>
+              <a:rPr lang="en-US" sz="900" dirty="0" smtClean="0"/>
+              <a:t> se </a:t>
+            </a:r>
+            <a:r>
+              <a:rPr lang="en-US" sz="900" dirty="0" err="1" smtClean="0"/>
+              <a:t>han</a:t>
             </a:r>
             <a:r>
               <a:rPr lang="en-US" sz="900" dirty="0" smtClean="0"/>
@@ -1769,7 +1775,7 @@
             </a:r>
             <a:r>
               <a:rPr lang="en-US" sz="900" dirty="0" err="1" smtClean="0"/>
-              <a:t>unas</a:t>
+              <a:t>estudiado</a:t>
             </a:r>
             <a:endParaRPr lang="es-ES" sz="900" dirty="0"/>
           </a:p>
@@ -1833,20 +1839,8 @@
           <a:p>
             <a:pPr algn="ctr"/>
             <a:r>
-              <a:rPr lang="en-US" sz="900" dirty="0"/>
-              <a:t>l</a:t>
-            </a:r>
-            <a:r>
-              <a:rPr lang="en-US" sz="900" dirty="0" smtClean="0"/>
-              <a:t>os </a:t>
-            </a:r>
-            <a:r>
-              <a:rPr lang="en-US" sz="900" dirty="0" err="1" smtClean="0"/>
-              <a:t>cuales</a:t>
-            </a:r>
-            <a:r>
-              <a:rPr lang="en-US" sz="900" dirty="0" smtClean="0"/>
-              <a:t> son</a:t>
+              <a:rPr lang="en-US" sz="900" smtClean="0"/>
+              <a:t>como</a:t>
             </a:r>
             <a:endParaRPr lang="es-ES" sz="900" dirty="0"/>
           </a:p>
@@ -1912,16 +1906,8 @@
           <a:p>
             <a:pPr algn="ctr"/>
             <a:r>
-              <a:rPr lang="en-US" sz="900" dirty="0"/>
-              <a:t>t</a:t>
-            </a:r>
-            <a:r>
-              <a:rPr lang="es-ES_tradnl" sz="900" dirty="0" err="1" smtClean="0"/>
-              <a:t>iene</a:t>
-            </a:r>
-            <a:r>
               <a:rPr lang="es-ES_tradnl" sz="900" dirty="0" smtClean="0"/>
-              <a:t> unos tipos</a:t>
+              <a:t> tipo</a:t>
             </a:r>
             <a:endParaRPr lang="es-ES" sz="900" dirty="0"/>
           </a:p>
@@ -2068,13 +2054,8 @@
             </a:r>
             <a:r>
               <a:rPr lang="es-ES_tradnl" sz="900" dirty="0" smtClean="0"/>
-              <a:t>n el vac</a:t>
-            </a:r>
-            <a:r>
-              <a:rPr lang="es-ES_tradnl" sz="900" dirty="0" smtClean="0"/>
-              <a:t>ío</a:t>
-            </a:r>
-            <a:endParaRPr lang="es-ES_tradnl" sz="900" dirty="0" smtClean="0"/>
+              <a:t>n el vacío</a:t>
+            </a:r>
           </a:p>
         </p:txBody>
       </p:sp>
@@ -2088,9 +2069,9 @@
           <p:nvPr/>
         </p:nvCxnSpPr>
         <p:spPr>
-          <a:xfrm>
-            <a:off x="7377689" y="1033761"/>
-            <a:ext cx="5936" cy="101077"/>
+          <a:xfrm flipV="1">
+            <a:off x="7377689" y="1134838"/>
+            <a:ext cx="5936" cy="37423"/>
           </a:xfrm>
           <a:prstGeom prst="straightConnector1">
             <a:avLst/>
@@ -2145,11 +2126,7 @@
             </a:r>
             <a:r>
               <a:rPr lang="en-US" sz="900" dirty="0" err="1" smtClean="0"/>
-              <a:t>gr</a:t>
-            </a:r>
-            <a:r>
-              <a:rPr lang="en-US" sz="900" dirty="0" err="1" smtClean="0"/>
-              <a:t>áficas</a:t>
+              <a:t>gráficas</a:t>
             </a:r>
             <a:r>
               <a:rPr lang="en-US" sz="900" dirty="0" smtClean="0"/>
@@ -2513,12 +2490,8 @@
           <a:p>
             <a:pPr algn="ctr"/>
             <a:r>
-              <a:rPr lang="en-US" sz="900" dirty="0" err="1"/>
-              <a:t>s</a:t>
-            </a:r>
-            <a:r>
               <a:rPr lang="en-US" sz="900" dirty="0" err="1" smtClean="0"/>
-              <a:t>us</a:t>
+              <a:t>cuyas</a:t>
             </a:r>
             <a:r>
               <a:rPr lang="en-US" sz="900" dirty="0" smtClean="0"/>
@@ -2569,11 +2542,7 @@
             </a:r>
             <a:r>
               <a:rPr lang="en-US" sz="900" dirty="0" err="1" smtClean="0"/>
-              <a:t>gr</a:t>
-            </a:r>
-            <a:r>
-              <a:rPr lang="en-US" sz="900" dirty="0" err="1" smtClean="0"/>
-              <a:t>áficas</a:t>
+              <a:t>gráficas</a:t>
             </a:r>
             <a:r>
               <a:rPr lang="en-US" sz="900" dirty="0" smtClean="0"/>
@@ -2710,21 +2679,8 @@
                   <a:schemeClr val="bg1"/>
                 </a:solidFill>
               </a:rPr>
-              <a:t>Aceleraci</a:t>
-            </a:r>
-            <a:r>
-              <a:rPr lang="es-ES_tradnl" sz="900" dirty="0" smtClean="0">
-                <a:solidFill>
-                  <a:schemeClr val="bg1"/>
-                </a:solidFill>
-              </a:rPr>
-              <a:t>ón-tiempo</a:t>
-            </a:r>
-            <a:endParaRPr lang="es-ES_tradnl" sz="900" dirty="0" smtClean="0">
-              <a:solidFill>
-                <a:schemeClr val="bg1"/>
-              </a:solidFill>
-            </a:endParaRPr>
+              <a:t>Aceleración-tiempo</a:t>
+            </a:r>
           </a:p>
         </p:txBody>
       </p:sp>
@@ -2872,15 +2828,7 @@
                   <a:schemeClr val="bg1"/>
                 </a:solidFill>
               </a:rPr>
-              <a:t>Ca</a:t>
-            </a:r>
-            <a:r>
-              <a:rPr lang="es-ES_tradnl" sz="900" dirty="0" smtClean="0">
-                <a:solidFill>
-                  <a:schemeClr val="bg1"/>
-                </a:solidFill>
-              </a:rPr>
-              <a:t>ída libre</a:t>
+              <a:t>Caída libre</a:t>
             </a:r>
             <a:endParaRPr lang="es-ES" sz="900" dirty="0">
               <a:solidFill>
@@ -2996,11 +2944,7 @@
             <a:pPr algn="ctr"/>
             <a:r>
               <a:rPr lang="es-ES_tradnl" sz="900" dirty="0"/>
-              <a:t>El cuerpo acelera mientras cae debido a g</a:t>
-            </a:r>
-            <a:r>
-              <a:rPr lang="es-ES_tradnl" sz="900" dirty="0"/>
-              <a:t> </a:t>
+              <a:t>El cuerpo acelera mientras cae debido a g </a:t>
             </a:r>
             <a:endParaRPr lang="es-ES_tradnl" sz="900" dirty="0" smtClean="0"/>
           </a:p>
@@ -3127,13 +3071,8 @@
             </a:r>
             <a:r>
               <a:rPr lang="es-ES_tradnl" sz="900" dirty="0" smtClean="0"/>
-              <a:t>n el vac</a:t>
-            </a:r>
-            <a:r>
-              <a:rPr lang="es-ES_tradnl" sz="900" dirty="0" smtClean="0"/>
-              <a:t>ío</a:t>
-            </a:r>
-            <a:endParaRPr lang="es-ES_tradnl" sz="900" dirty="0" smtClean="0"/>
+              <a:t>n el vacío</a:t>
+            </a:r>
           </a:p>
         </p:txBody>
       </p:sp>
@@ -3183,11 +3122,7 @@
             <a:pPr algn="ctr"/>
             <a:r>
               <a:rPr lang="es-ES_tradnl" sz="900" dirty="0"/>
-              <a:t>El cuerpo frena mientras sube debido a g</a:t>
-            </a:r>
-            <a:r>
-              <a:rPr lang="es-ES_tradnl" sz="900" dirty="0"/>
-              <a:t> </a:t>
+              <a:t>El cuerpo frena mientras sube debido a g </a:t>
             </a:r>
             <a:endParaRPr lang="es-ES_tradnl" sz="900" dirty="0" smtClean="0"/>
           </a:p>
@@ -3272,11 +3207,7 @@
             <a:pPr algn="ctr"/>
             <a:r>
               <a:rPr lang="es-ES_tradnl" sz="900" dirty="0"/>
-              <a:t>Al llegar a la máxima altura v=0</a:t>
-            </a:r>
-            <a:r>
-              <a:rPr lang="es-ES_tradnl" sz="900" dirty="0"/>
-              <a:t> </a:t>
+              <a:t>Al llegar a la máxima altura v=0 </a:t>
             </a:r>
             <a:endParaRPr lang="es-ES_tradnl" sz="900" dirty="0" smtClean="0"/>
           </a:p>
@@ -3495,15 +3426,7 @@
                   <a:schemeClr val="bg1"/>
                 </a:solidFill>
               </a:rPr>
-              <a:t>Desplazamiento (</a:t>
-            </a:r>
-            <a:r>
-              <a:rPr lang="es-ES_tradnl" sz="900" dirty="0" smtClean="0">
-                <a:solidFill>
-                  <a:schemeClr val="bg1"/>
-                </a:solidFill>
-              </a:rPr>
-              <a:t>∆x)</a:t>
+              <a:t>Desplazamiento (∆x)</a:t>
             </a:r>
           </a:p>
           <a:p>
@@ -3596,15 +3519,7 @@
                   <a:schemeClr val="bg1"/>
                 </a:solidFill>
               </a:rPr>
-              <a:t>Aceleraci</a:t>
-            </a:r>
-            <a:r>
-              <a:rPr lang="es-ES_tradnl" sz="900" dirty="0" smtClean="0">
-                <a:solidFill>
-                  <a:schemeClr val="bg1"/>
-                </a:solidFill>
-              </a:rPr>
-              <a:t>ón (</a:t>
+              <a:t>Aceleración (</a:t>
             </a:r>
             <a:r>
               <a:rPr lang="en-US" sz="900" dirty="0">
@@ -3757,7 +3672,7 @@
   <p:timing>
     <p:tnLst>
       <p:par>
-        <p:cTn xmlns:p14="http://schemas.microsoft.com/office/powerpoint/2010/main" id="1" dur="indefinite" restart="never" nodeType="tmRoot"/>
+        <p:cTn id="1" dur="indefinite" restart="never" nodeType="tmRoot"/>
       </p:par>
     </p:tnLst>
   </p:timing>
@@ -4019,7 +3934,7 @@
   <a:extraClrSchemeLst/>
   <a:extLst>
     <a:ext uri="{05A4C25C-085E-4340-85A3-A5531E510DB2}">
-      <thm15:themeFamily xmlns:thm15="http://schemas.microsoft.com/office/thememl/2012/main" xmlns="" name="Office Theme" id="{62F939B6-93AF-4DB8-9C6B-D6C7DFDC589F}" vid="{4A3C46E8-61CC-4603-A589-7422A47A8E4A}"/>
+      <thm15:themeFamily xmlns:thm15="http://schemas.microsoft.com/office/thememl/2012/main" name="Office Theme" id="{62F939B6-93AF-4DB8-9C6B-D6C7DFDC589F}" vid="{4A3C46E8-61CC-4603-A589-7422A47A8E4A}"/>
     </a:ext>
   </a:extLst>
 </a:theme>

</xml_diff>